<commit_message>
Updated with links and more information focused on eigenvalues and eigenvectors.
</commit_message>
<xml_diff>
--- a/Notes/Principal_Component_Analysis.pptx
+++ b/Notes/Principal_Component_Analysis.pptx
@@ -13,12 +13,15 @@
     <p:sldId id="305" r:id="rId10"/>
     <p:sldId id="306" r:id="rId11"/>
     <p:sldId id="307" r:id="rId12"/>
-    <p:sldId id="309" r:id="rId13"/>
-    <p:sldId id="310" r:id="rId14"/>
-    <p:sldId id="311" r:id="rId15"/>
-    <p:sldId id="303" r:id="rId16"/>
-    <p:sldId id="313" r:id="rId17"/>
-    <p:sldId id="312" r:id="rId18"/>
+    <p:sldId id="314" r:id="rId13"/>
+    <p:sldId id="315" r:id="rId14"/>
+    <p:sldId id="309" r:id="rId15"/>
+    <p:sldId id="310" r:id="rId16"/>
+    <p:sldId id="311" r:id="rId17"/>
+    <p:sldId id="316" r:id="rId18"/>
+    <p:sldId id="303" r:id="rId19"/>
+    <p:sldId id="313" r:id="rId20"/>
+    <p:sldId id="312" r:id="rId21"/>
   </p:sldIdLst>
   <p:sldSz cx="12192000" cy="6858000"/>
   <p:notesSz cx="6858000" cy="9144000"/>
@@ -369,7 +372,7 @@
           <a:p>
             <a:fld id="{9184DA70-C731-4C70-880D-CCD4705E623C}" type="datetime1">
               <a:rPr lang="en-US" smtClean="0"/>
-              <a:t>5/30/2022</a:t>
+              <a:t>7/18/2022</a:t>
             </a:fld>
             <a:endParaRPr lang="en-US" dirty="0"/>
           </a:p>
@@ -557,7 +560,7 @@
           <a:p>
             <a:fld id="{4BE1D723-8F53-4F53-90B0-1982A396982E}" type="datetime1">
               <a:rPr lang="en-US" smtClean="0"/>
-              <a:t>5/30/2022</a:t>
+              <a:t>7/18/2022</a:t>
             </a:fld>
             <a:endParaRPr lang="en-US" dirty="0"/>
           </a:p>
@@ -930,7 +933,7 @@
           <a:p>
             <a:fld id="{97669AF7-7BEB-44E4-9852-375E34362B5B}" type="datetime1">
               <a:rPr lang="en-US" smtClean="0"/>
-              <a:t>5/30/2022</a:t>
+              <a:t>7/18/2022</a:t>
             </a:fld>
             <a:endParaRPr lang="en-US" dirty="0"/>
           </a:p>
@@ -1185,7 +1188,7 @@
           <a:p>
             <a:fld id="{BAAAC38D-0552-4C82-B593-E6124DFADBE2}" type="datetime1">
               <a:rPr lang="en-US" smtClean="0"/>
-              <a:t>5/30/2022</a:t>
+              <a:t>7/18/2022</a:t>
             </a:fld>
             <a:endParaRPr lang="en-US" dirty="0"/>
           </a:p>
@@ -1582,7 +1585,7 @@
           <a:p>
             <a:fld id="{D9DF0F1C-5577-4ACB-BB62-DF8F3C494C7E}" type="datetime1">
               <a:rPr lang="en-US" smtClean="0"/>
-              <a:t>5/30/2022</a:t>
+              <a:t>7/18/2022</a:t>
             </a:fld>
             <a:endParaRPr lang="en-US" dirty="0"/>
           </a:p>
@@ -1718,7 +1721,7 @@
           <a:p>
             <a:fld id="{1775B394-D9F9-4F0C-B15D-605F45CB9E9F}" type="datetime1">
               <a:rPr lang="en-US" smtClean="0"/>
-              <a:t>5/30/2022</a:t>
+              <a:t>7/18/2022</a:t>
             </a:fld>
             <a:endParaRPr lang="en-US" dirty="0"/>
           </a:p>
@@ -1875,7 +1878,7 @@
           <a:p>
             <a:fld id="{39667345-2558-425A-8533-9BFDBCE15005}" type="datetime1">
               <a:rPr lang="en-US" smtClean="0"/>
-              <a:t>5/30/2022</a:t>
+              <a:t>7/18/2022</a:t>
             </a:fld>
             <a:endParaRPr lang="en-US" dirty="0"/>
           </a:p>
@@ -2204,7 +2207,7 @@
           <a:p>
             <a:fld id="{92BEA474-078D-4E9B-9B14-09A87B19DC46}" type="datetime1">
               <a:rPr lang="en-US" smtClean="0"/>
-              <a:t>5/30/2022</a:t>
+              <a:t>7/18/2022</a:t>
             </a:fld>
             <a:endParaRPr lang="en-US" dirty="0"/>
           </a:p>
@@ -2554,7 +2557,7 @@
           <a:p>
             <a:fld id="{4907D986-8816-4272-A432-0437A28A9828}" type="datetime1">
               <a:rPr lang="en-US" smtClean="0"/>
-              <a:t>5/30/2022</a:t>
+              <a:t>7/18/2022</a:t>
             </a:fld>
             <a:endParaRPr lang="en-US" dirty="0"/>
           </a:p>
@@ -2815,7 +2818,7 @@
           <a:p>
             <a:fld id="{62D6E202-B606-4609-B914-27C9371A1F6D}" type="datetime1">
               <a:rPr lang="en-US" smtClean="0"/>
-              <a:t>5/30/2022</a:t>
+              <a:t>7/18/2022</a:t>
             </a:fld>
             <a:endParaRPr lang="en-US" dirty="0"/>
           </a:p>
@@ -3785,10 +3788,10 @@
       </p:grpSpPr>
       <p:sp>
         <p:nvSpPr>
-          <p:cNvPr id="2" name="Title 1">
-            <a:extLst>
-              <a:ext uri="{FF2B5EF4-FFF2-40B4-BE49-F238E27FC236}">
-                <a16:creationId xmlns:a16="http://schemas.microsoft.com/office/drawing/2014/main" id="{F17B0EC9-A7E7-79CD-4B0D-0629C3A6D3CD}"/>
+          <p:cNvPr id="7" name="Title 6">
+            <a:extLst>
+              <a:ext uri="{FF2B5EF4-FFF2-40B4-BE49-F238E27FC236}">
+                <a16:creationId xmlns:a16="http://schemas.microsoft.com/office/drawing/2014/main" id="{40CAB43D-F6E6-4532-1862-C130A88DB349}"/>
               </a:ext>
             </a:extLst>
           </p:cNvPr>
@@ -3806,17 +3809,17 @@
           <a:p>
             <a:r>
               <a:rPr lang="en-US" dirty="0"/>
-              <a:t>Step 4 – Feature Vector</a:t>
-            </a:r>
-          </a:p>
-        </p:txBody>
-      </p:sp>
-      <p:sp>
-        <p:nvSpPr>
-          <p:cNvPr id="3" name="Content Placeholder 2">
-            <a:extLst>
-              <a:ext uri="{FF2B5EF4-FFF2-40B4-BE49-F238E27FC236}">
-                <a16:creationId xmlns:a16="http://schemas.microsoft.com/office/drawing/2014/main" id="{398A8818-0828-CDEA-6E70-BB0A7F44CD19}"/>
+              <a:t>Math behind eigenvectors and values.</a:t>
+            </a:r>
+          </a:p>
+        </p:txBody>
+      </p:sp>
+      <p:sp>
+        <p:nvSpPr>
+          <p:cNvPr id="8" name="Content Placeholder 7">
+            <a:extLst>
+              <a:ext uri="{FF2B5EF4-FFF2-40B4-BE49-F238E27FC236}">
+                <a16:creationId xmlns:a16="http://schemas.microsoft.com/office/drawing/2014/main" id="{9CD66D77-07FA-5CBB-5A56-01D2BB0B89B5}"/>
               </a:ext>
             </a:extLst>
           </p:cNvPr>
@@ -3833,28 +3836,14 @@
           <a:lstStyle/>
           <a:p>
             <a:r>
-              <a:rPr lang="en-US" dirty="0"/>
-              <a:t>Purpose – Determine whether or not to discard some principal components. </a:t>
-            </a:r>
-          </a:p>
-          <a:p>
-            <a:r>
-              <a:rPr lang="en-US" dirty="0"/>
-              <a:t>How – by ordering the eigenvalues in descending order can now what ones to potentially disregard. Form a matrix with the remaining ones eigenvectors. This matrix is a </a:t>
-            </a:r>
-            <a:r>
-              <a:rPr lang="en-US" u="sng" dirty="0"/>
-              <a:t>Feature vector</a:t>
-            </a:r>
-            <a:r>
-              <a:rPr lang="en-US" dirty="0"/>
-              <a:t>.</a:t>
-            </a:r>
-          </a:p>
-          <a:p>
-            <a:r>
-              <a:rPr lang="en-US" dirty="0"/>
-              <a:t>Notes – This is the first step towards dimensionality reduction. </a:t>
+              <a:rPr lang="en-US" dirty="0">
+                <a:hlinkClick r:id="rId2"/>
+              </a:rPr>
+              <a:t>https://www.visiondummy.com/2014/03/eigenvalues-eigenvectors/</a:t>
+            </a:r>
+            <a:r>
+              <a:rPr lang="en-US" dirty="0"/>
+              <a:t> </a:t>
             </a:r>
           </a:p>
         </p:txBody>
@@ -3862,7 +3851,7 @@
     </p:spTree>
     <p:extLst>
       <p:ext uri="{BB962C8B-B14F-4D97-AF65-F5344CB8AC3E}">
-        <p14:creationId xmlns:p14="http://schemas.microsoft.com/office/powerpoint/2010/main" val="1275758852"/>
+        <p14:creationId xmlns:p14="http://schemas.microsoft.com/office/powerpoint/2010/main" val="2948911380"/>
       </p:ext>
     </p:extLst>
   </p:cSld>
@@ -3894,7 +3883,7 @@
           <p:cNvPr id="2" name="Title 1">
             <a:extLst>
               <a:ext uri="{FF2B5EF4-FFF2-40B4-BE49-F238E27FC236}">
-                <a16:creationId xmlns:a16="http://schemas.microsoft.com/office/drawing/2014/main" id="{C2F17A12-4CCD-478C-066D-B7C3475D1D3F}"/>
+                <a16:creationId xmlns:a16="http://schemas.microsoft.com/office/drawing/2014/main" id="{36722B20-723F-52EA-343C-631888D32DDC}"/>
               </a:ext>
             </a:extLst>
           </p:cNvPr>
@@ -3912,7 +3901,7 @@
           <a:p>
             <a:r>
               <a:rPr lang="en-US" dirty="0"/>
-              <a:t>Step 5 – Recast data along the principal component analysis. </a:t>
+              <a:t>Step 3 – cont.</a:t>
             </a:r>
           </a:p>
         </p:txBody>
@@ -3922,7 +3911,7 @@
           <p:cNvPr id="3" name="Content Placeholder 2">
             <a:extLst>
               <a:ext uri="{FF2B5EF4-FFF2-40B4-BE49-F238E27FC236}">
-                <a16:creationId xmlns:a16="http://schemas.microsoft.com/office/drawing/2014/main" id="{8BACAC3A-6C15-8346-A127-B97A1E0B6434}"/>
+                <a16:creationId xmlns:a16="http://schemas.microsoft.com/office/drawing/2014/main" id="{2D176B9C-D5D8-EB1A-F36A-9281411AB1B7}"/>
               </a:ext>
             </a:extLst>
           </p:cNvPr>
@@ -3940,29 +3929,37 @@
           <a:p>
             <a:r>
               <a:rPr lang="en-US" dirty="0"/>
-              <a:t>Purpose – to show the data in terms of the principal components </a:t>
-            </a:r>
-          </a:p>
-          <a:p>
-            <a:r>
-              <a:rPr lang="en-US" dirty="0"/>
-              <a:t>How – </a:t>
-            </a:r>
-            <a:r>
-              <a:rPr lang="en-US" dirty="0" err="1"/>
-              <a:t>FinalDataSet</a:t>
-            </a:r>
-            <a:r>
-              <a:rPr lang="en-US" dirty="0"/>
-              <a:t> = Feature Vector * Standardized Original Dataset (data from step 1). </a:t>
-            </a:r>
+              <a:t>How to determine what eigenvector explains or captures most of the variance? 	</a:t>
+            </a:r>
+          </a:p>
+          <a:p>
+            <a:pPr lvl="1"/>
+            <a:r>
+              <a:rPr lang="en-US" dirty="0"/>
+              <a:t>an eigenvalue / Sum of all eigenvalues. </a:t>
+            </a:r>
+          </a:p>
+          <a:p>
+            <a:endParaRPr lang="en-US" dirty="0"/>
+          </a:p>
+          <a:p>
+            <a:r>
+              <a:rPr lang="en-US" dirty="0"/>
+              <a:t>Ordering by descending order gives the rank of significance. </a:t>
+            </a:r>
+          </a:p>
+          <a:p>
+            <a:pPr marL="0" indent="0">
+              <a:buNone/>
+            </a:pPr>
+            <a:endParaRPr lang="en-US" dirty="0"/>
           </a:p>
         </p:txBody>
       </p:sp>
     </p:spTree>
     <p:extLst>
       <p:ext uri="{BB962C8B-B14F-4D97-AF65-F5344CB8AC3E}">
-        <p14:creationId xmlns:p14="http://schemas.microsoft.com/office/powerpoint/2010/main" val="1125574166"/>
+        <p14:creationId xmlns:p14="http://schemas.microsoft.com/office/powerpoint/2010/main" val="4088272245"/>
       </p:ext>
     </p:extLst>
   </p:cSld>
@@ -3994,7 +3991,7 @@
           <p:cNvPr id="2" name="Title 1">
             <a:extLst>
               <a:ext uri="{FF2B5EF4-FFF2-40B4-BE49-F238E27FC236}">
-                <a16:creationId xmlns:a16="http://schemas.microsoft.com/office/drawing/2014/main" id="{84D3E75E-6052-4C65-32AC-C6B34D6EEDCB}"/>
+                <a16:creationId xmlns:a16="http://schemas.microsoft.com/office/drawing/2014/main" id="{F17B0EC9-A7E7-79CD-4B0D-0629C3A6D3CD}"/>
               </a:ext>
             </a:extLst>
           </p:cNvPr>
@@ -4012,7 +4009,7 @@
           <a:p>
             <a:r>
               <a:rPr lang="en-US" dirty="0"/>
-              <a:t>Math behind a PCA</a:t>
+              <a:t>Step 4 – Feature Vector</a:t>
             </a:r>
           </a:p>
         </p:txBody>
@@ -4022,7 +4019,7 @@
           <p:cNvPr id="3" name="Content Placeholder 2">
             <a:extLst>
               <a:ext uri="{FF2B5EF4-FFF2-40B4-BE49-F238E27FC236}">
-                <a16:creationId xmlns:a16="http://schemas.microsoft.com/office/drawing/2014/main" id="{02C23A8C-6D25-B5DF-8630-E8410CDF88C5}"/>
+                <a16:creationId xmlns:a16="http://schemas.microsoft.com/office/drawing/2014/main" id="{398A8818-0828-CDEA-6E70-BB0A7F44CD19}"/>
               </a:ext>
             </a:extLst>
           </p:cNvPr>
@@ -4037,6 +4034,35 @@
         <p:txBody>
           <a:bodyPr/>
           <a:lstStyle/>
+          <a:p>
+            <a:r>
+              <a:rPr lang="en-US" dirty="0"/>
+              <a:t>Purpose – Determine whether or not to discard some principal components. </a:t>
+            </a:r>
+          </a:p>
+          <a:p>
+            <a:r>
+              <a:rPr lang="en-US" dirty="0"/>
+              <a:t>How – by ordering the eigenvalues in descending order can now what ones to potentially disregard. Form a matrix with the remaining ones eigenvectors. This matrix is a </a:t>
+            </a:r>
+            <a:r>
+              <a:rPr lang="en-US" u="sng" dirty="0"/>
+              <a:t>Feature vector</a:t>
+            </a:r>
+            <a:r>
+              <a:rPr lang="en-US" dirty="0"/>
+              <a:t>.</a:t>
+            </a:r>
+          </a:p>
+          <a:p>
+            <a:r>
+              <a:rPr lang="en-US" dirty="0"/>
+              <a:t>Notes – This is the first step towards dimensionality reduction. </a:t>
+            </a:r>
+          </a:p>
+          <a:p>
+            <a:endParaRPr lang="en-US" dirty="0"/>
+          </a:p>
           <a:p>
             <a:endParaRPr lang="en-US" dirty="0"/>
           </a:p>
@@ -4045,7 +4071,7 @@
     </p:spTree>
     <p:extLst>
       <p:ext uri="{BB962C8B-B14F-4D97-AF65-F5344CB8AC3E}">
-        <p14:creationId xmlns:p14="http://schemas.microsoft.com/office/powerpoint/2010/main" val="3409352510"/>
+        <p14:creationId xmlns:p14="http://schemas.microsoft.com/office/powerpoint/2010/main" val="1275758852"/>
       </p:ext>
     </p:extLst>
   </p:cSld>
@@ -4077,7 +4103,7 @@
           <p:cNvPr id="2" name="Title 1">
             <a:extLst>
               <a:ext uri="{FF2B5EF4-FFF2-40B4-BE49-F238E27FC236}">
-                <a16:creationId xmlns:a16="http://schemas.microsoft.com/office/drawing/2014/main" id="{A8BAB5F6-AA55-6501-EB29-B59526254804}"/>
+                <a16:creationId xmlns:a16="http://schemas.microsoft.com/office/drawing/2014/main" id="{C2F17A12-4CCD-478C-066D-B7C3475D1D3F}"/>
               </a:ext>
             </a:extLst>
           </p:cNvPr>
@@ -4090,14 +4116,12 @@
         </p:nvSpPr>
         <p:spPr/>
         <p:txBody>
-          <a:bodyPr>
-            <a:noAutofit/>
-          </a:bodyPr>
-          <a:lstStyle/>
-          <a:p>
-            <a:r>
-              <a:rPr lang="en-US" sz="3200" dirty="0"/>
-              <a:t>From https://www.datacamp.com/tutorial/pca-analysis-r</a:t>
+          <a:bodyPr/>
+          <a:lstStyle/>
+          <a:p>
+            <a:r>
+              <a:rPr lang="en-US" dirty="0"/>
+              <a:t>Step 5 – Recast data along the principal component analysis. </a:t>
             </a:r>
           </a:p>
         </p:txBody>
@@ -4107,7 +4131,7 @@
           <p:cNvPr id="3" name="Content Placeholder 2">
             <a:extLst>
               <a:ext uri="{FF2B5EF4-FFF2-40B4-BE49-F238E27FC236}">
-                <a16:creationId xmlns:a16="http://schemas.microsoft.com/office/drawing/2014/main" id="{270D9B15-D0DC-0B01-86A0-F813F3C967CC}"/>
+                <a16:creationId xmlns:a16="http://schemas.microsoft.com/office/drawing/2014/main" id="{8BACAC3A-6C15-8346-A127-B97A1E0B6434}"/>
               </a:ext>
             </a:extLst>
           </p:cNvPr>
@@ -4125,7 +4149,21 @@
           <a:p>
             <a:r>
               <a:rPr lang="en-US" dirty="0"/>
-              <a:t>Principal components help us understand what direction has the most variance from the dataset. </a:t>
+              <a:t>Purpose – to show the data in terms of the principal components </a:t>
+            </a:r>
+          </a:p>
+          <a:p>
+            <a:r>
+              <a:rPr lang="en-US" dirty="0"/>
+              <a:t>How – </a:t>
+            </a:r>
+            <a:r>
+              <a:rPr lang="en-US" dirty="0" err="1"/>
+              <a:t>FinalDataSet</a:t>
+            </a:r>
+            <a:r>
+              <a:rPr lang="en-US" dirty="0"/>
+              <a:t> = Feature Vector * Standardized Original Dataset (data from step 1). </a:t>
             </a:r>
           </a:p>
         </p:txBody>
@@ -4133,7 +4171,7 @@
     </p:spTree>
     <p:extLst>
       <p:ext uri="{BB962C8B-B14F-4D97-AF65-F5344CB8AC3E}">
-        <p14:creationId xmlns:p14="http://schemas.microsoft.com/office/powerpoint/2010/main" val="3137599239"/>
+        <p14:creationId xmlns:p14="http://schemas.microsoft.com/office/powerpoint/2010/main" val="1125574166"/>
       </p:ext>
     </p:extLst>
   </p:cSld>
@@ -4165,6 +4203,321 @@
           <p:cNvPr id="2" name="Title 1">
             <a:extLst>
               <a:ext uri="{FF2B5EF4-FFF2-40B4-BE49-F238E27FC236}">
+                <a16:creationId xmlns:a16="http://schemas.microsoft.com/office/drawing/2014/main" id="{A21446B7-A4FB-B0A6-8A83-F39B6811343B}"/>
+              </a:ext>
+            </a:extLst>
+          </p:cNvPr>
+          <p:cNvSpPr>
+            <a:spLocks noGrp="1"/>
+          </p:cNvSpPr>
+          <p:nvPr>
+            <p:ph type="title"/>
+          </p:nvPr>
+        </p:nvSpPr>
+        <p:spPr/>
+        <p:txBody>
+          <a:bodyPr/>
+          <a:lstStyle/>
+          <a:p>
+            <a:r>
+              <a:rPr lang="en-US" dirty="0"/>
+              <a:t>Purpose</a:t>
+            </a:r>
+          </a:p>
+        </p:txBody>
+      </p:sp>
+      <p:sp>
+        <p:nvSpPr>
+          <p:cNvPr id="3" name="Content Placeholder 2">
+            <a:extLst>
+              <a:ext uri="{FF2B5EF4-FFF2-40B4-BE49-F238E27FC236}">
+                <a16:creationId xmlns:a16="http://schemas.microsoft.com/office/drawing/2014/main" id="{F2EF8FC2-07A7-6CB3-6E2A-4BEEC004CC97}"/>
+              </a:ext>
+            </a:extLst>
+          </p:cNvPr>
+          <p:cNvSpPr>
+            <a:spLocks noGrp="1"/>
+          </p:cNvSpPr>
+          <p:nvPr>
+            <p:ph idx="1"/>
+          </p:nvPr>
+        </p:nvSpPr>
+        <p:spPr/>
+        <p:txBody>
+          <a:bodyPr/>
+          <a:lstStyle/>
+          <a:p>
+            <a:r>
+              <a:rPr lang="en-US" dirty="0"/>
+              <a:t>By understanding the components or variables of the data that have the most impact on the outcome, it provides us with the ability to understand the data. We are able to make insights from it. </a:t>
+            </a:r>
+          </a:p>
+          <a:p>
+            <a:endParaRPr lang="en-US" dirty="0"/>
+          </a:p>
+          <a:p>
+            <a:r>
+              <a:rPr lang="en-US" b="0" i="0" dirty="0">
+                <a:solidFill>
+                  <a:srgbClr val="4D4E4F"/>
+                </a:solidFill>
+                <a:effectLst/>
+                <a:latin typeface="Poppins" panose="00000500000000000000" pitchFamily="2" charset="0"/>
+              </a:rPr>
+              <a:t>“So each principal component cutting through the scatterplot represents a decrease in the system’s entropy, in its unpredictability.” </a:t>
+            </a:r>
+            <a:r>
+              <a:rPr lang="en-US" b="0" i="0" dirty="0">
+                <a:solidFill>
+                  <a:srgbClr val="4D4E4F"/>
+                </a:solidFill>
+                <a:effectLst/>
+                <a:latin typeface="Poppins" panose="00000500000000000000" pitchFamily="2" charset="0"/>
+                <a:hlinkClick r:id="rId2"/>
+              </a:rPr>
+              <a:t>link</a:t>
+            </a:r>
+            <a:endParaRPr lang="en-US" b="0" i="0" dirty="0">
+              <a:solidFill>
+                <a:srgbClr val="4D4E4F"/>
+              </a:solidFill>
+              <a:effectLst/>
+              <a:latin typeface="Poppins" panose="00000500000000000000" pitchFamily="2" charset="0"/>
+            </a:endParaRPr>
+          </a:p>
+          <a:p>
+            <a:endParaRPr lang="en-US" dirty="0"/>
+          </a:p>
+        </p:txBody>
+      </p:sp>
+    </p:spTree>
+    <p:extLst>
+      <p:ext uri="{BB962C8B-B14F-4D97-AF65-F5344CB8AC3E}">
+        <p14:creationId xmlns:p14="http://schemas.microsoft.com/office/powerpoint/2010/main" val="731610185"/>
+      </p:ext>
+    </p:extLst>
+  </p:cSld>
+  <p:clrMapOvr>
+    <a:masterClrMapping/>
+  </p:clrMapOvr>
+</p:sld>
+</file>
+
+<file path=ppt/slides/slide15.xml><?xml version="1.0" encoding="utf-8"?>
+<p:sld xmlns:a="http://schemas.openxmlformats.org/drawingml/2006/main" xmlns:r="http://schemas.openxmlformats.org/officeDocument/2006/relationships" xmlns:p="http://schemas.openxmlformats.org/presentationml/2006/main">
+  <p:cSld>
+    <p:spTree>
+      <p:nvGrpSpPr>
+        <p:cNvPr id="1" name=""/>
+        <p:cNvGrpSpPr/>
+        <p:nvPr/>
+      </p:nvGrpSpPr>
+      <p:grpSpPr>
+        <a:xfrm>
+          <a:off x="0" y="0"/>
+          <a:ext cx="0" cy="0"/>
+          <a:chOff x="0" y="0"/>
+          <a:chExt cx="0" cy="0"/>
+        </a:xfrm>
+      </p:grpSpPr>
+      <p:sp>
+        <p:nvSpPr>
+          <p:cNvPr id="2" name="Title 1">
+            <a:extLst>
+              <a:ext uri="{FF2B5EF4-FFF2-40B4-BE49-F238E27FC236}">
+                <a16:creationId xmlns:a16="http://schemas.microsoft.com/office/drawing/2014/main" id="{84D3E75E-6052-4C65-32AC-C6B34D6EEDCB}"/>
+              </a:ext>
+            </a:extLst>
+          </p:cNvPr>
+          <p:cNvSpPr>
+            <a:spLocks noGrp="1"/>
+          </p:cNvSpPr>
+          <p:nvPr>
+            <p:ph type="title"/>
+          </p:nvPr>
+        </p:nvSpPr>
+        <p:spPr/>
+        <p:txBody>
+          <a:bodyPr/>
+          <a:lstStyle/>
+          <a:p>
+            <a:r>
+              <a:rPr lang="en-US" dirty="0"/>
+              <a:t>Math behind a PCA</a:t>
+            </a:r>
+          </a:p>
+        </p:txBody>
+      </p:sp>
+      <p:sp>
+        <p:nvSpPr>
+          <p:cNvPr id="3" name="Content Placeholder 2">
+            <a:extLst>
+              <a:ext uri="{FF2B5EF4-FFF2-40B4-BE49-F238E27FC236}">
+                <a16:creationId xmlns:a16="http://schemas.microsoft.com/office/drawing/2014/main" id="{02C23A8C-6D25-B5DF-8630-E8410CDF88C5}"/>
+              </a:ext>
+            </a:extLst>
+          </p:cNvPr>
+          <p:cNvSpPr>
+            <a:spLocks noGrp="1"/>
+          </p:cNvSpPr>
+          <p:nvPr>
+            <p:ph idx="1"/>
+          </p:nvPr>
+        </p:nvSpPr>
+        <p:spPr/>
+        <p:txBody>
+          <a:bodyPr/>
+          <a:lstStyle/>
+          <a:p>
+            <a:r>
+              <a:rPr lang="en-US" dirty="0"/>
+              <a:t>Much of the math is explained here </a:t>
+            </a:r>
+            <a:r>
+              <a:rPr lang="en-US" dirty="0">
+                <a:hlinkClick r:id="rId2"/>
+              </a:rPr>
+              <a:t>https://wiki.pathmind.com/eigenvector#:~:text=It%20builds%20on%20those%20ideas,special%20relationship%20between%20two%20things</a:t>
+            </a:r>
+            <a:r>
+              <a:rPr lang="en-US" dirty="0"/>
+              <a:t>. </a:t>
+            </a:r>
+          </a:p>
+          <a:p>
+            <a:endParaRPr lang="en-US" dirty="0"/>
+          </a:p>
+          <a:p>
+            <a:r>
+              <a:rPr lang="en-US" dirty="0"/>
+              <a:t>Uses mean, standard deviation, variance, covariance and eigenvalues and eigenvectors. Then uses ratios to help explain things. </a:t>
+            </a:r>
+          </a:p>
+        </p:txBody>
+      </p:sp>
+    </p:spTree>
+    <p:extLst>
+      <p:ext uri="{BB962C8B-B14F-4D97-AF65-F5344CB8AC3E}">
+        <p14:creationId xmlns:p14="http://schemas.microsoft.com/office/powerpoint/2010/main" val="3409352510"/>
+      </p:ext>
+    </p:extLst>
+  </p:cSld>
+  <p:clrMapOvr>
+    <a:masterClrMapping/>
+  </p:clrMapOvr>
+</p:sld>
+</file>
+
+<file path=ppt/slides/slide16.xml><?xml version="1.0" encoding="utf-8"?>
+<p:sld xmlns:a="http://schemas.openxmlformats.org/drawingml/2006/main" xmlns:r="http://schemas.openxmlformats.org/officeDocument/2006/relationships" xmlns:p="http://schemas.openxmlformats.org/presentationml/2006/main">
+  <p:cSld>
+    <p:spTree>
+      <p:nvGrpSpPr>
+        <p:cNvPr id="1" name=""/>
+        <p:cNvGrpSpPr/>
+        <p:nvPr/>
+      </p:nvGrpSpPr>
+      <p:grpSpPr>
+        <a:xfrm>
+          <a:off x="0" y="0"/>
+          <a:ext cx="0" cy="0"/>
+          <a:chOff x="0" y="0"/>
+          <a:chExt cx="0" cy="0"/>
+        </a:xfrm>
+      </p:grpSpPr>
+      <p:sp>
+        <p:nvSpPr>
+          <p:cNvPr id="2" name="Title 1">
+            <a:extLst>
+              <a:ext uri="{FF2B5EF4-FFF2-40B4-BE49-F238E27FC236}">
+                <a16:creationId xmlns:a16="http://schemas.microsoft.com/office/drawing/2014/main" id="{A8BAB5F6-AA55-6501-EB29-B59526254804}"/>
+              </a:ext>
+            </a:extLst>
+          </p:cNvPr>
+          <p:cNvSpPr>
+            <a:spLocks noGrp="1"/>
+          </p:cNvSpPr>
+          <p:nvPr>
+            <p:ph type="title"/>
+          </p:nvPr>
+        </p:nvSpPr>
+        <p:spPr/>
+        <p:txBody>
+          <a:bodyPr>
+            <a:noAutofit/>
+          </a:bodyPr>
+          <a:lstStyle/>
+          <a:p>
+            <a:r>
+              <a:rPr lang="en-US" sz="3200" dirty="0"/>
+              <a:t>From https://www.datacamp.com/tutorial/pca-analysis-r</a:t>
+            </a:r>
+          </a:p>
+        </p:txBody>
+      </p:sp>
+      <p:sp>
+        <p:nvSpPr>
+          <p:cNvPr id="3" name="Content Placeholder 2">
+            <a:extLst>
+              <a:ext uri="{FF2B5EF4-FFF2-40B4-BE49-F238E27FC236}">
+                <a16:creationId xmlns:a16="http://schemas.microsoft.com/office/drawing/2014/main" id="{270D9B15-D0DC-0B01-86A0-F813F3C967CC}"/>
+              </a:ext>
+            </a:extLst>
+          </p:cNvPr>
+          <p:cNvSpPr>
+            <a:spLocks noGrp="1"/>
+          </p:cNvSpPr>
+          <p:nvPr>
+            <p:ph idx="1"/>
+          </p:nvPr>
+        </p:nvSpPr>
+        <p:spPr/>
+        <p:txBody>
+          <a:bodyPr/>
+          <a:lstStyle/>
+          <a:p>
+            <a:r>
+              <a:rPr lang="en-US" dirty="0"/>
+              <a:t>Principal components help us understand what direction has the most variance from the dataset. </a:t>
+            </a:r>
+          </a:p>
+        </p:txBody>
+      </p:sp>
+    </p:spTree>
+    <p:extLst>
+      <p:ext uri="{BB962C8B-B14F-4D97-AF65-F5344CB8AC3E}">
+        <p14:creationId xmlns:p14="http://schemas.microsoft.com/office/powerpoint/2010/main" val="3137599239"/>
+      </p:ext>
+    </p:extLst>
+  </p:cSld>
+  <p:clrMapOvr>
+    <a:masterClrMapping/>
+  </p:clrMapOvr>
+</p:sld>
+</file>
+
+<file path=ppt/slides/slide17.xml><?xml version="1.0" encoding="utf-8"?>
+<p:sld xmlns:a="http://schemas.openxmlformats.org/drawingml/2006/main" xmlns:r="http://schemas.openxmlformats.org/officeDocument/2006/relationships" xmlns:p="http://schemas.openxmlformats.org/presentationml/2006/main">
+  <p:cSld>
+    <p:spTree>
+      <p:nvGrpSpPr>
+        <p:cNvPr id="1" name=""/>
+        <p:cNvGrpSpPr/>
+        <p:nvPr/>
+      </p:nvGrpSpPr>
+      <p:grpSpPr>
+        <a:xfrm>
+          <a:off x="0" y="0"/>
+          <a:ext cx="0" cy="0"/>
+          <a:chOff x="0" y="0"/>
+          <a:chExt cx="0" cy="0"/>
+        </a:xfrm>
+      </p:grpSpPr>
+      <p:sp>
+        <p:nvSpPr>
+          <p:cNvPr id="2" name="Title 1">
+            <a:extLst>
+              <a:ext uri="{FF2B5EF4-FFF2-40B4-BE49-F238E27FC236}">
                 <a16:creationId xmlns:a16="http://schemas.microsoft.com/office/drawing/2014/main" id="{158105C2-CD83-7688-6C55-FB05A8A8E196}"/>
               </a:ext>
             </a:extLst>
@@ -4223,6 +4576,42 @@
                 <a:hlinkClick r:id="rId3"/>
               </a:rPr>
               <a:t>https://www.datacamp.com/tutorial/pca-analysis-r</a:t>
+            </a:r>
+            <a:r>
+              <a:rPr lang="en-US" dirty="0"/>
+              <a:t> </a:t>
+            </a:r>
+          </a:p>
+          <a:p>
+            <a:r>
+              <a:rPr lang="en-US" dirty="0">
+                <a:hlinkClick r:id="rId4"/>
+              </a:rPr>
+              <a:t>https://wiki.pathmind.com/eigenvector#:~:text=It%20builds%20on%20those%20ideas,special%20relationship%20between%20two%20things</a:t>
+            </a:r>
+            <a:r>
+              <a:rPr lang="en-US" dirty="0"/>
+              <a:t>. </a:t>
+            </a:r>
+          </a:p>
+          <a:p>
+            <a:r>
+              <a:rPr lang="en-US" dirty="0">
+                <a:hlinkClick r:id="rId5"/>
+              </a:rPr>
+              <a:t>https://www.visiondummy.com/2014/03/eigenvalues-eigenvectors/</a:t>
+            </a:r>
+            <a:r>
+              <a:rPr lang="en-US" dirty="0"/>
+              <a:t> </a:t>
+            </a:r>
+          </a:p>
+          <a:p>
+            <a:r>
+              <a:rPr lang="en-US" dirty="0">
+                <a:hlinkClick r:id="rId6"/>
+              </a:rPr>
+              <a:t>https://www.youtube.com/watch?v=FgakZw6K1QQ</a:t>
             </a:r>
             <a:r>
               <a:rPr lang="en-US" dirty="0"/>
@@ -4468,6 +4857,21 @@
             </a:r>
           </a:p>
           <a:p>
+            <a:pPr marL="201168" lvl="1" indent="0">
+              <a:buNone/>
+            </a:pPr>
+            <a:endParaRPr lang="en-US" dirty="0"/>
+          </a:p>
+          <a:p>
+            <a:pPr marL="201168" lvl="1" indent="0">
+              <a:buNone/>
+            </a:pPr>
+            <a:r>
+              <a:rPr lang="en-US" dirty="0"/>
+              <a:t>Used in neural networks or image classification. </a:t>
+            </a:r>
+          </a:p>
+          <a:p>
             <a:pPr marL="0" indent="0">
               <a:buNone/>
             </a:pPr>
@@ -4560,7 +4964,10 @@
             </a:r>
           </a:p>
           <a:p>
-            <a:endParaRPr lang="en-US" dirty="0"/>
+            <a:r>
+              <a:rPr lang="en-US" dirty="0"/>
+              <a:t>A relationship between an independent and dependent variable.</a:t>
+            </a:r>
           </a:p>
           <a:p>
             <a:r>
@@ -5648,7 +6055,7 @@
           <p:cNvPr id="2" name="Title 1">
             <a:extLst>
               <a:ext uri="{FF2B5EF4-FFF2-40B4-BE49-F238E27FC236}">
-                <a16:creationId xmlns:a16="http://schemas.microsoft.com/office/drawing/2014/main" id="{36722B20-723F-52EA-343C-631888D32DDC}"/>
+                <a16:creationId xmlns:a16="http://schemas.microsoft.com/office/drawing/2014/main" id="{6BC66718-0D03-C654-79C5-C088D2327D97}"/>
               </a:ext>
             </a:extLst>
           </p:cNvPr>
@@ -5664,27 +6071,24 @@
           <a:bodyPr/>
           <a:lstStyle/>
           <a:p>
-            <a:r>
-              <a:rPr lang="en-US" dirty="0"/>
-              <a:t>Step 3 – cont.</a:t>
-            </a:r>
-          </a:p>
-        </p:txBody>
-      </p:sp>
-      <p:sp>
-        <p:nvSpPr>
-          <p:cNvPr id="3" name="Content Placeholder 2">
-            <a:extLst>
-              <a:ext uri="{FF2B5EF4-FFF2-40B4-BE49-F238E27FC236}">
-                <a16:creationId xmlns:a16="http://schemas.microsoft.com/office/drawing/2014/main" id="{2D176B9C-D5D8-EB1A-F36A-9281411AB1B7}"/>
-              </a:ext>
-            </a:extLst>
-          </p:cNvPr>
-          <p:cNvSpPr>
-            <a:spLocks noGrp="1"/>
-          </p:cNvSpPr>
-          <p:nvPr>
-            <p:ph idx="1"/>
+            <a:endParaRPr lang="en-US"/>
+          </a:p>
+        </p:txBody>
+      </p:sp>
+      <p:sp>
+        <p:nvSpPr>
+          <p:cNvPr id="3" name="Text Placeholder 2">
+            <a:extLst>
+              <a:ext uri="{FF2B5EF4-FFF2-40B4-BE49-F238E27FC236}">
+                <a16:creationId xmlns:a16="http://schemas.microsoft.com/office/drawing/2014/main" id="{DAC19801-8491-19B6-1D05-69DE8AC5ABBC}"/>
+              </a:ext>
+            </a:extLst>
+          </p:cNvPr>
+          <p:cNvSpPr>
+            <a:spLocks noGrp="1"/>
+          </p:cNvSpPr>
+          <p:nvPr>
+            <p:ph type="body" idx="1"/>
           </p:nvPr>
         </p:nvSpPr>
         <p:spPr/>
@@ -5694,37 +6098,115 @@
           <a:p>
             <a:r>
               <a:rPr lang="en-US" dirty="0"/>
-              <a:t>How to determine what eigenvector explains or captures most of the variance? 	</a:t>
-            </a:r>
-          </a:p>
-          <a:p>
-            <a:pPr lvl="1"/>
-            <a:r>
-              <a:rPr lang="en-US" dirty="0"/>
-              <a:t>an eigenvalue / Sum of all eigenvalues. </a:t>
-            </a:r>
-          </a:p>
-          <a:p>
-            <a:endParaRPr lang="en-US" dirty="0"/>
-          </a:p>
-          <a:p>
-            <a:r>
-              <a:rPr lang="en-US" dirty="0"/>
-              <a:t>Ordering by descending order gives the rank of significance. </a:t>
-            </a:r>
-          </a:p>
-          <a:p>
-            <a:pPr marL="0" indent="0">
-              <a:buNone/>
-            </a:pPr>
-            <a:endParaRPr lang="en-US" dirty="0"/>
+              <a:t>Eigenvectors			</a:t>
+            </a:r>
+          </a:p>
+        </p:txBody>
+      </p:sp>
+      <p:sp>
+        <p:nvSpPr>
+          <p:cNvPr id="4" name="Content Placeholder 3">
+            <a:extLst>
+              <a:ext uri="{FF2B5EF4-FFF2-40B4-BE49-F238E27FC236}">
+                <a16:creationId xmlns:a16="http://schemas.microsoft.com/office/drawing/2014/main" id="{613BFFAD-ECE3-CDD3-21B2-5469EE63C153}"/>
+              </a:ext>
+            </a:extLst>
+          </p:cNvPr>
+          <p:cNvSpPr>
+            <a:spLocks noGrp="1"/>
+          </p:cNvSpPr>
+          <p:nvPr>
+            <p:ph sz="half" idx="2"/>
+          </p:nvPr>
+        </p:nvSpPr>
+        <p:spPr/>
+        <p:txBody>
+          <a:bodyPr>
+            <a:normAutofit fontScale="92500"/>
+          </a:bodyPr>
+          <a:lstStyle/>
+          <a:p>
+            <a:r>
+              <a:rPr lang="en-US" dirty="0"/>
+              <a:t>Vectors not affected by a linear transformation when applied to them. These vectors are know as eigenvectors of the transformation. This is why they are called eigenvectors because eigen in German means ‘specific’</a:t>
+            </a:r>
+          </a:p>
+          <a:p>
+            <a:r>
+              <a:rPr lang="en-US" dirty="0"/>
+              <a:t>Represents an orientation </a:t>
+            </a:r>
+          </a:p>
+          <a:p>
+            <a:r>
+              <a:rPr lang="en-US" dirty="0"/>
+              <a:t>They do not change direction only magnitude or length.</a:t>
+            </a:r>
+          </a:p>
+        </p:txBody>
+      </p:sp>
+      <p:sp>
+        <p:nvSpPr>
+          <p:cNvPr id="5" name="Text Placeholder 4">
+            <a:extLst>
+              <a:ext uri="{FF2B5EF4-FFF2-40B4-BE49-F238E27FC236}">
+                <a16:creationId xmlns:a16="http://schemas.microsoft.com/office/drawing/2014/main" id="{B631B074-F14E-ED0E-7D37-EB295E4AEF98}"/>
+              </a:ext>
+            </a:extLst>
+          </p:cNvPr>
+          <p:cNvSpPr>
+            <a:spLocks noGrp="1"/>
+          </p:cNvSpPr>
+          <p:nvPr>
+            <p:ph type="body" sz="quarter" idx="3"/>
+          </p:nvPr>
+        </p:nvSpPr>
+        <p:spPr/>
+        <p:txBody>
+          <a:bodyPr/>
+          <a:lstStyle/>
+          <a:p>
+            <a:r>
+              <a:rPr lang="en-US" dirty="0"/>
+              <a:t>Eigenvalues</a:t>
+            </a:r>
+          </a:p>
+        </p:txBody>
+      </p:sp>
+      <p:sp>
+        <p:nvSpPr>
+          <p:cNvPr id="6" name="Content Placeholder 5">
+            <a:extLst>
+              <a:ext uri="{FF2B5EF4-FFF2-40B4-BE49-F238E27FC236}">
+                <a16:creationId xmlns:a16="http://schemas.microsoft.com/office/drawing/2014/main" id="{0C42D309-E983-5CB1-314B-D39709C5A552}"/>
+              </a:ext>
+            </a:extLst>
+          </p:cNvPr>
+          <p:cNvSpPr>
+            <a:spLocks noGrp="1"/>
+          </p:cNvSpPr>
+          <p:nvPr>
+            <p:ph sz="quarter" idx="4"/>
+          </p:nvPr>
+        </p:nvSpPr>
+        <p:spPr/>
+        <p:txBody>
+          <a:bodyPr>
+            <a:normAutofit fontScale="92500"/>
+          </a:bodyPr>
+          <a:lstStyle/>
+          <a:p>
+            <a:r>
+              <a:rPr lang="en-US" dirty="0"/>
+              <a:t>Specifies the size of the eigenvector. Represent the magnitude of the vector.</a:t>
+            </a:r>
           </a:p>
         </p:txBody>
       </p:sp>
     </p:spTree>
     <p:extLst>
       <p:ext uri="{BB962C8B-B14F-4D97-AF65-F5344CB8AC3E}">
-        <p14:creationId xmlns:p14="http://schemas.microsoft.com/office/powerpoint/2010/main" val="4088272245"/>
+        <p14:creationId xmlns:p14="http://schemas.microsoft.com/office/powerpoint/2010/main" val="3557690247"/>
       </p:ext>
     </p:extLst>
   </p:cSld>
@@ -6061,6 +6543,15 @@
 </file>
 
 <file path=customXml/item1.xml><?xml version="1.0" encoding="utf-8"?>
+<p:properties xmlns:p="http://schemas.microsoft.com/office/2006/metadata/properties" xmlns:xsi="http://www.w3.org/2001/XMLSchema-instance" xmlns:pc="http://schemas.microsoft.com/office/infopath/2007/PartnerControls">
+  <documentManagement>
+    <Status xmlns="71af3243-3dd4-4a8d-8c0d-dd76da1f02a5">Not started</Status>
+    <MediaServiceKeyPoints xmlns="71af3243-3dd4-4a8d-8c0d-dd76da1f02a5" xsi:nil="true"/>
+  </documentManagement>
+</p:properties>
+</file>
+
+<file path=customXml/item2.xml><?xml version="1.0" encoding="utf-8"?>
 <ct:contentTypeSchema xmlns:ct="http://schemas.microsoft.com/office/2006/metadata/contentType" xmlns:ma="http://schemas.microsoft.com/office/2006/metadata/properties/metaAttributes" ct:_="" ma:_="" ma:contentTypeName="Document" ma:contentTypeID="0x01010079F111ED35F8CC479449609E8A0923A6" ma:contentTypeVersion="12" ma:contentTypeDescription="Create a new document." ma:contentTypeScope="" ma:versionID="a410dd7f93c95333ffa1b60ed6adedd1">
   <xsd:schema xmlns:xsd="http://www.w3.org/2001/XMLSchema" xmlns:xs="http://www.w3.org/2001/XMLSchema" xmlns:p="http://schemas.microsoft.com/office/2006/metadata/properties" xmlns:ns2="71af3243-3dd4-4a8d-8c0d-dd76da1f02a5" xmlns:ns3="16c05727-aa75-4e4a-9b5f-8a80a1165891" targetNamespace="http://schemas.microsoft.com/office/2006/metadata/properties" ma:root="true" ma:fieldsID="a936d9baba76aa3866493feff160faab" ns2:_="" ns3:_="">
     <xsd:import namespace="71af3243-3dd4-4a8d-8c0d-dd76da1f02a5"/>
@@ -6281,15 +6772,6 @@
 </ct:contentTypeSchema>
 </file>
 
-<file path=customXml/item2.xml><?xml version="1.0" encoding="utf-8"?>
-<p:properties xmlns:p="http://schemas.microsoft.com/office/2006/metadata/properties" xmlns:xsi="http://www.w3.org/2001/XMLSchema-instance" xmlns:pc="http://schemas.microsoft.com/office/infopath/2007/PartnerControls">
-  <documentManagement>
-    <Status xmlns="71af3243-3dd4-4a8d-8c0d-dd76da1f02a5">Not started</Status>
-    <MediaServiceKeyPoints xmlns="71af3243-3dd4-4a8d-8c0d-dd76da1f02a5" xsi:nil="true"/>
-  </documentManagement>
-</p:properties>
-</file>
-
 <file path=customXml/item3.xml><?xml version="1.0" encoding="utf-8"?>
 <?mso-contentType ?>
 <FormTemplates xmlns="http://schemas.microsoft.com/sharepoint/v3/contenttype/forms">
@@ -6300,6 +6782,16 @@
 </file>
 
 <file path=customXml/itemProps1.xml><?xml version="1.0" encoding="utf-8"?>
+<ds:datastoreItem xmlns:ds="http://schemas.openxmlformats.org/officeDocument/2006/customXml" ds:itemID="{A03EEFF0-FB57-4CB4-8BFC-DF397689E2ED}">
+  <ds:schemaRefs>
+    <ds:schemaRef ds:uri="http://schemas.microsoft.com/office/2006/metadata/properties"/>
+    <ds:schemaRef ds:uri="http://schemas.microsoft.com/office/infopath/2007/PartnerControls"/>
+    <ds:schemaRef ds:uri="71af3243-3dd4-4a8d-8c0d-dd76da1f02a5"/>
+  </ds:schemaRefs>
+</ds:datastoreItem>
+</file>
+
+<file path=customXml/itemProps2.xml><?xml version="1.0" encoding="utf-8"?>
 <ds:datastoreItem xmlns:ds="http://schemas.openxmlformats.org/officeDocument/2006/customXml" ds:itemID="{93932EF5-314F-409E-8020-FEE5FA0795B9}">
   <ds:schemaRefs>
     <ds:schemaRef ds:uri="http://schemas.microsoft.com/office/2006/metadata/contentType"/>
@@ -6318,16 +6810,6 @@
 </ds:datastoreItem>
 </file>
 
-<file path=customXml/itemProps2.xml><?xml version="1.0" encoding="utf-8"?>
-<ds:datastoreItem xmlns:ds="http://schemas.openxmlformats.org/officeDocument/2006/customXml" ds:itemID="{A03EEFF0-FB57-4CB4-8BFC-DF397689E2ED}">
-  <ds:schemaRefs>
-    <ds:schemaRef ds:uri="http://schemas.microsoft.com/office/2006/metadata/properties"/>
-    <ds:schemaRef ds:uri="http://schemas.microsoft.com/office/infopath/2007/PartnerControls"/>
-    <ds:schemaRef ds:uri="71af3243-3dd4-4a8d-8c0d-dd76da1f02a5"/>
-  </ds:schemaRefs>
-</ds:datastoreItem>
-</file>
-
 <file path=customXml/itemProps3.xml><?xml version="1.0" encoding="utf-8"?>
 <ds:datastoreItem xmlns:ds="http://schemas.openxmlformats.org/officeDocument/2006/customXml" ds:itemID="{AA3F7EDC-E5B4-4BBC-9D2A-CBE6D46C37AD}">
   <ds:schemaRefs>

</xml_diff>